<commit_message>
Define intrusion and intrusion detection
</commit_message>
<xml_diff>
--- a/NSL_KDD_Network_Security_Analysis.pptx
+++ b/NSL_KDD_Network_Security_Analysis.pptx
@@ -7,6 +7,7 @@
   <p:sldIdLst>
     <p:sldId id="256" r:id="rId2"/>
     <p:sldId id="257" r:id="rId3"/>
+    <p:sldId id="258" r:id="rId4"/>
   </p:sldIdLst>
   <p:sldSz cx="12192000" cy="6858000"/>
   <p:notesSz cx="6858000" cy="9144000"/>
@@ -3634,6 +3635,391 @@
 </p:sld>
 </file>
 
+<file path=ppt/slides/slide3.xml><?xml version="1.0" encoding="utf-8"?>
+<p:sld xmlns:a="http://schemas.openxmlformats.org/drawingml/2006/main" xmlns:r="http://schemas.openxmlformats.org/officeDocument/2006/relationships" xmlns:p="http://schemas.openxmlformats.org/presentationml/2006/main">
+  <p:cSld>
+    <p:spTree>
+      <p:nvGrpSpPr>
+        <p:cNvPr id="1" name=""/>
+        <p:cNvGrpSpPr/>
+        <p:nvPr/>
+      </p:nvGrpSpPr>
+      <p:grpSpPr>
+        <a:xfrm>
+          <a:off x="0" y="0"/>
+          <a:ext cx="0" cy="0"/>
+          <a:chOff x="0" y="0"/>
+          <a:chExt cx="0" cy="0"/>
+        </a:xfrm>
+      </p:grpSpPr>
+      <p:sp>
+        <p:nvSpPr>
+          <p:cNvPr id="2" name="Title 1">
+            <a:extLst>
+              <a:ext uri="{FF2B5EF4-FFF2-40B4-BE49-F238E27FC236}">
+                <a16:creationId xmlns:a16="http://schemas.microsoft.com/office/drawing/2014/main" id="{44330C74-EB9D-4ADE-B22B-91161A4BB401}"/>
+              </a:ext>
+            </a:extLst>
+          </p:cNvPr>
+          <p:cNvSpPr>
+            <a:spLocks noGrp="1"/>
+          </p:cNvSpPr>
+          <p:nvPr>
+            <p:ph type="title"/>
+          </p:nvPr>
+        </p:nvSpPr>
+        <p:spPr/>
+        <p:txBody>
+          <a:bodyPr/>
+          <a:lstStyle/>
+          <a:p>
+            <a:r>
+              <a:rPr lang="en-US" dirty="0"/>
+              <a:t>INTRUSION</a:t>
+            </a:r>
+          </a:p>
+        </p:txBody>
+      </p:sp>
+      <p:sp>
+        <p:nvSpPr>
+          <p:cNvPr id="3" name="Content Placeholder 2">
+            <a:extLst>
+              <a:ext uri="{FF2B5EF4-FFF2-40B4-BE49-F238E27FC236}">
+                <a16:creationId xmlns:a16="http://schemas.microsoft.com/office/drawing/2014/main" id="{84E53B4C-2679-4311-8C0B-72B7E8BDB356}"/>
+              </a:ext>
+            </a:extLst>
+          </p:cNvPr>
+          <p:cNvSpPr>
+            <a:spLocks noGrp="1"/>
+          </p:cNvSpPr>
+          <p:nvPr>
+            <p:ph idx="1"/>
+          </p:nvPr>
+        </p:nvSpPr>
+        <p:spPr>
+          <a:xfrm>
+            <a:off x="838200" y="1690688"/>
+            <a:ext cx="10515600" cy="1043410"/>
+          </a:xfrm>
+        </p:spPr>
+        <p:txBody>
+          <a:bodyPr/>
+          <a:lstStyle/>
+          <a:p>
+            <a:r>
+              <a:rPr lang="en-US" dirty="0"/>
+              <a:t>An attempt to bypass the security mechanisms of a system</a:t>
+            </a:r>
+          </a:p>
+          <a:p>
+            <a:r>
+              <a:rPr lang="en-US" dirty="0"/>
+              <a:t>Compromise </a:t>
+            </a:r>
+            <a:r>
+              <a:rPr lang="en-US" b="1" dirty="0"/>
+              <a:t>Confidentiality</a:t>
+            </a:r>
+            <a:r>
+              <a:rPr lang="en-US" dirty="0"/>
+              <a:t>, </a:t>
+            </a:r>
+            <a:r>
+              <a:rPr lang="en-US" b="1" dirty="0"/>
+              <a:t>Integrity</a:t>
+            </a:r>
+            <a:r>
+              <a:rPr lang="en-US" dirty="0"/>
+              <a:t> and </a:t>
+            </a:r>
+            <a:r>
+              <a:rPr lang="en-US" b="1" dirty="0"/>
+              <a:t>Availability</a:t>
+            </a:r>
+            <a:r>
+              <a:rPr lang="en-US" dirty="0"/>
+              <a:t> </a:t>
+            </a:r>
+            <a:r>
+              <a:rPr lang="en-US" b="1" dirty="0"/>
+              <a:t>(CIA)</a:t>
+            </a:r>
+          </a:p>
+        </p:txBody>
+      </p:sp>
+      <p:sp>
+        <p:nvSpPr>
+          <p:cNvPr id="4" name="Title 1">
+            <a:extLst>
+              <a:ext uri="{FF2B5EF4-FFF2-40B4-BE49-F238E27FC236}">
+                <a16:creationId xmlns:a16="http://schemas.microsoft.com/office/drawing/2014/main" id="{98DE1D3C-838C-4535-9015-E78BE11F5A77}"/>
+              </a:ext>
+            </a:extLst>
+          </p:cNvPr>
+          <p:cNvSpPr txBox="1">
+            <a:spLocks/>
+          </p:cNvSpPr>
+          <p:nvPr/>
+        </p:nvSpPr>
+        <p:spPr>
+          <a:xfrm>
+            <a:off x="838200" y="3101335"/>
+            <a:ext cx="10515600" cy="1325563"/>
+          </a:xfrm>
+          <a:prstGeom prst="rect">
+            <a:avLst/>
+          </a:prstGeom>
+        </p:spPr>
+        <p:txBody>
+          <a:bodyPr vert="horz" lIns="91440" tIns="45720" rIns="91440" bIns="45720" rtlCol="0" anchor="ctr">
+            <a:normAutofit/>
+          </a:bodyPr>
+          <a:lstStyle>
+            <a:lvl1pPr algn="l" defTabSz="914400" rtl="0" eaLnBrk="1" latinLnBrk="0" hangingPunct="1">
+              <a:lnSpc>
+                <a:spcPct val="90000"/>
+              </a:lnSpc>
+              <a:spcBef>
+                <a:spcPct val="0"/>
+              </a:spcBef>
+              <a:buNone/>
+              <a:defRPr sz="4400" kern="1200">
+                <a:solidFill>
+                  <a:schemeClr val="bg1"/>
+                </a:solidFill>
+                <a:latin typeface="Times New Roman" panose="02020603050405020304" pitchFamily="18" charset="0"/>
+                <a:ea typeface="+mj-ea"/>
+                <a:cs typeface="Times New Roman" panose="02020603050405020304" pitchFamily="18" charset="0"/>
+              </a:defRPr>
+            </a:lvl1pPr>
+          </a:lstStyle>
+          <a:p>
+            <a:r>
+              <a:rPr lang="en-US" dirty="0"/>
+              <a:t>INTRUSION DETECTION</a:t>
+            </a:r>
+          </a:p>
+        </p:txBody>
+      </p:sp>
+      <p:sp>
+        <p:nvSpPr>
+          <p:cNvPr id="5" name="Content Placeholder 2">
+            <a:extLst>
+              <a:ext uri="{FF2B5EF4-FFF2-40B4-BE49-F238E27FC236}">
+                <a16:creationId xmlns:a16="http://schemas.microsoft.com/office/drawing/2014/main" id="{44860E6E-E5B5-4A10-8227-BA5B141BE022}"/>
+              </a:ext>
+            </a:extLst>
+          </p:cNvPr>
+          <p:cNvSpPr txBox="1">
+            <a:spLocks/>
+          </p:cNvSpPr>
+          <p:nvPr/>
+        </p:nvSpPr>
+        <p:spPr>
+          <a:xfrm>
+            <a:off x="838200" y="4426898"/>
+            <a:ext cx="10515600" cy="1043410"/>
+          </a:xfrm>
+          <a:prstGeom prst="rect">
+            <a:avLst/>
+          </a:prstGeom>
+        </p:spPr>
+        <p:txBody>
+          <a:bodyPr vert="horz" lIns="91440" tIns="45720" rIns="91440" bIns="45720" rtlCol="0">
+            <a:noAutofit/>
+          </a:bodyPr>
+          <a:lstStyle>
+            <a:lvl1pPr marL="228600" indent="-228600" algn="l" defTabSz="914400" rtl="0" eaLnBrk="1" latinLnBrk="0" hangingPunct="1">
+              <a:lnSpc>
+                <a:spcPct val="90000"/>
+              </a:lnSpc>
+              <a:spcBef>
+                <a:spcPts val="1000"/>
+              </a:spcBef>
+              <a:buFont typeface="Arial" panose="020B0604020202020204" pitchFamily="34" charset="0"/>
+              <a:buChar char="•"/>
+              <a:defRPr sz="2800" kern="1200">
+                <a:solidFill>
+                  <a:schemeClr val="bg1"/>
+                </a:solidFill>
+                <a:latin typeface="Times New Roman" panose="02020603050405020304" pitchFamily="18" charset="0"/>
+                <a:ea typeface="+mn-ea"/>
+                <a:cs typeface="Times New Roman" panose="02020603050405020304" pitchFamily="18" charset="0"/>
+              </a:defRPr>
+            </a:lvl1pPr>
+            <a:lvl2pPr marL="685800" indent="-228600" algn="l" defTabSz="914400" rtl="0" eaLnBrk="1" latinLnBrk="0" hangingPunct="1">
+              <a:lnSpc>
+                <a:spcPct val="90000"/>
+              </a:lnSpc>
+              <a:spcBef>
+                <a:spcPts val="500"/>
+              </a:spcBef>
+              <a:buFont typeface="Arial" panose="020B0604020202020204" pitchFamily="34" charset="0"/>
+              <a:buChar char="•"/>
+              <a:defRPr sz="2400" kern="1200">
+                <a:solidFill>
+                  <a:schemeClr val="bg1"/>
+                </a:solidFill>
+                <a:latin typeface="Times New Roman" panose="02020603050405020304" pitchFamily="18" charset="0"/>
+                <a:ea typeface="+mn-ea"/>
+                <a:cs typeface="Times New Roman" panose="02020603050405020304" pitchFamily="18" charset="0"/>
+              </a:defRPr>
+            </a:lvl2pPr>
+            <a:lvl3pPr marL="1143000" indent="-228600" algn="l" defTabSz="914400" rtl="0" eaLnBrk="1" latinLnBrk="0" hangingPunct="1">
+              <a:lnSpc>
+                <a:spcPct val="90000"/>
+              </a:lnSpc>
+              <a:spcBef>
+                <a:spcPts val="500"/>
+              </a:spcBef>
+              <a:buFont typeface="Arial" panose="020B0604020202020204" pitchFamily="34" charset="0"/>
+              <a:buChar char="•"/>
+              <a:defRPr sz="2000" kern="1200">
+                <a:solidFill>
+                  <a:schemeClr val="bg1"/>
+                </a:solidFill>
+                <a:latin typeface="Times New Roman" panose="02020603050405020304" pitchFamily="18" charset="0"/>
+                <a:ea typeface="+mn-ea"/>
+                <a:cs typeface="Times New Roman" panose="02020603050405020304" pitchFamily="18" charset="0"/>
+              </a:defRPr>
+            </a:lvl3pPr>
+            <a:lvl4pPr marL="1600200" indent="-228600" algn="l" defTabSz="914400" rtl="0" eaLnBrk="1" latinLnBrk="0" hangingPunct="1">
+              <a:lnSpc>
+                <a:spcPct val="90000"/>
+              </a:lnSpc>
+              <a:spcBef>
+                <a:spcPts val="500"/>
+              </a:spcBef>
+              <a:buFont typeface="Arial" panose="020B0604020202020204" pitchFamily="34" charset="0"/>
+              <a:buChar char="•"/>
+              <a:defRPr sz="1800" kern="1200">
+                <a:solidFill>
+                  <a:schemeClr val="bg1"/>
+                </a:solidFill>
+                <a:latin typeface="Times New Roman" panose="02020603050405020304" pitchFamily="18" charset="0"/>
+                <a:ea typeface="+mn-ea"/>
+                <a:cs typeface="Times New Roman" panose="02020603050405020304" pitchFamily="18" charset="0"/>
+              </a:defRPr>
+            </a:lvl4pPr>
+            <a:lvl5pPr marL="2057400" indent="-228600" algn="l" defTabSz="914400" rtl="0" eaLnBrk="1" latinLnBrk="0" hangingPunct="1">
+              <a:lnSpc>
+                <a:spcPct val="90000"/>
+              </a:lnSpc>
+              <a:spcBef>
+                <a:spcPts val="500"/>
+              </a:spcBef>
+              <a:buFont typeface="Arial" panose="020B0604020202020204" pitchFamily="34" charset="0"/>
+              <a:buChar char="•"/>
+              <a:defRPr sz="1800" kern="1200">
+                <a:solidFill>
+                  <a:schemeClr val="bg1"/>
+                </a:solidFill>
+                <a:latin typeface="Times New Roman" panose="02020603050405020304" pitchFamily="18" charset="0"/>
+                <a:ea typeface="+mn-ea"/>
+                <a:cs typeface="Times New Roman" panose="02020603050405020304" pitchFamily="18" charset="0"/>
+              </a:defRPr>
+            </a:lvl5pPr>
+            <a:lvl6pPr marL="2514600" indent="-228600" algn="l" defTabSz="914400" rtl="0" eaLnBrk="1" latinLnBrk="0" hangingPunct="1">
+              <a:lnSpc>
+                <a:spcPct val="90000"/>
+              </a:lnSpc>
+              <a:spcBef>
+                <a:spcPts val="500"/>
+              </a:spcBef>
+              <a:buFont typeface="Arial" panose="020B0604020202020204" pitchFamily="34" charset="0"/>
+              <a:buChar char="•"/>
+              <a:defRPr sz="1800" kern="1200">
+                <a:solidFill>
+                  <a:schemeClr val="tx1"/>
+                </a:solidFill>
+                <a:latin typeface="+mn-lt"/>
+                <a:ea typeface="+mn-ea"/>
+                <a:cs typeface="+mn-cs"/>
+              </a:defRPr>
+            </a:lvl6pPr>
+            <a:lvl7pPr marL="2971800" indent="-228600" algn="l" defTabSz="914400" rtl="0" eaLnBrk="1" latinLnBrk="0" hangingPunct="1">
+              <a:lnSpc>
+                <a:spcPct val="90000"/>
+              </a:lnSpc>
+              <a:spcBef>
+                <a:spcPts val="500"/>
+              </a:spcBef>
+              <a:buFont typeface="Arial" panose="020B0604020202020204" pitchFamily="34" charset="0"/>
+              <a:buChar char="•"/>
+              <a:defRPr sz="1800" kern="1200">
+                <a:solidFill>
+                  <a:schemeClr val="tx1"/>
+                </a:solidFill>
+                <a:latin typeface="+mn-lt"/>
+                <a:ea typeface="+mn-ea"/>
+                <a:cs typeface="+mn-cs"/>
+              </a:defRPr>
+            </a:lvl7pPr>
+            <a:lvl8pPr marL="3429000" indent="-228600" algn="l" defTabSz="914400" rtl="0" eaLnBrk="1" latinLnBrk="0" hangingPunct="1">
+              <a:lnSpc>
+                <a:spcPct val="90000"/>
+              </a:lnSpc>
+              <a:spcBef>
+                <a:spcPts val="500"/>
+              </a:spcBef>
+              <a:buFont typeface="Arial" panose="020B0604020202020204" pitchFamily="34" charset="0"/>
+              <a:buChar char="•"/>
+              <a:defRPr sz="1800" kern="1200">
+                <a:solidFill>
+                  <a:schemeClr val="tx1"/>
+                </a:solidFill>
+                <a:latin typeface="+mn-lt"/>
+                <a:ea typeface="+mn-ea"/>
+                <a:cs typeface="+mn-cs"/>
+              </a:defRPr>
+            </a:lvl8pPr>
+            <a:lvl9pPr marL="3886200" indent="-228600" algn="l" defTabSz="914400" rtl="0" eaLnBrk="1" latinLnBrk="0" hangingPunct="1">
+              <a:lnSpc>
+                <a:spcPct val="90000"/>
+              </a:lnSpc>
+              <a:spcBef>
+                <a:spcPts val="500"/>
+              </a:spcBef>
+              <a:buFont typeface="Arial" panose="020B0604020202020204" pitchFamily="34" charset="0"/>
+              <a:buChar char="•"/>
+              <a:defRPr sz="1800" kern="1200">
+                <a:solidFill>
+                  <a:schemeClr val="tx1"/>
+                </a:solidFill>
+                <a:latin typeface="+mn-lt"/>
+                <a:ea typeface="+mn-ea"/>
+                <a:cs typeface="+mn-cs"/>
+              </a:defRPr>
+            </a:lvl9pPr>
+          </a:lstStyle>
+          <a:p>
+            <a:r>
+              <a:rPr lang="en-US" dirty="0"/>
+              <a:t>Monitor various events that occur in a system</a:t>
+            </a:r>
+          </a:p>
+          <a:p>
+            <a:r>
+              <a:rPr lang="en-US" dirty="0"/>
+              <a:t>Analyze for signs of intrusions (flagged/anomalous behavior)</a:t>
+            </a:r>
+            <a:endParaRPr lang="en-US" b="1" dirty="0"/>
+          </a:p>
+        </p:txBody>
+      </p:sp>
+    </p:spTree>
+    <p:extLst>
+      <p:ext uri="{BB962C8B-B14F-4D97-AF65-F5344CB8AC3E}">
+        <p14:creationId xmlns:p14="http://schemas.microsoft.com/office/powerpoint/2010/main" val="2519677008"/>
+      </p:ext>
+    </p:extLst>
+  </p:cSld>
+  <p:clrMapOvr>
+    <a:masterClrMapping/>
+  </p:clrMapOvr>
+</p:sld>
+</file>
+
 <file path=ppt/theme/theme1.xml><?xml version="1.0" encoding="utf-8"?>
 <a:theme xmlns:a="http://schemas.openxmlformats.org/drawingml/2006/main" name="Office Theme">
   <a:themeElements>

</xml_diff>